<commit_message>
Fixed Agend UUID creation and handshake process
Signed-off-by: Christian Pinto <christian.pinto@ibm.com>
</commit_message>
<xml_diff>
--- a/imgs/sources.pptx
+++ b/imgs/sources.pptx
@@ -104,6 +104,11 @@
       </a:defRPr>
     </a:lvl9pPr>
   </p:defaultTextStyle>
+  <p:extLst>
+    <p:ext uri="{EFAFB233-063F-42B5-8137-9DF3F51BA10A}">
+      <p15:sldGuideLst xmlns:p15="http://schemas.microsoft.com/office/powerpoint/2012/main"/>
+    </p:ext>
+  </p:extLst>
 </p:presentation>
 </file>
 
@@ -256,7 +261,7 @@
           <a:p>
             <a:fld id="{370547DC-8235-9043-BAD3-3D5B5F6916E7}" type="datetimeFigureOut">
               <a:rPr lang="en-US" smtClean="0"/>
-              <a:t>2/2/24</a:t>
+              <a:t>2/8/24</a:t>
             </a:fld>
             <a:endParaRPr lang="en-US"/>
           </a:p>
@@ -456,7 +461,7 @@
           <a:p>
             <a:fld id="{370547DC-8235-9043-BAD3-3D5B5F6916E7}" type="datetimeFigureOut">
               <a:rPr lang="en-US" smtClean="0"/>
-              <a:t>2/2/24</a:t>
+              <a:t>2/8/24</a:t>
             </a:fld>
             <a:endParaRPr lang="en-US"/>
           </a:p>
@@ -666,7 +671,7 @@
           <a:p>
             <a:fld id="{370547DC-8235-9043-BAD3-3D5B5F6916E7}" type="datetimeFigureOut">
               <a:rPr lang="en-US" smtClean="0"/>
-              <a:t>2/2/24</a:t>
+              <a:t>2/8/24</a:t>
             </a:fld>
             <a:endParaRPr lang="en-US"/>
           </a:p>
@@ -866,7 +871,7 @@
           <a:p>
             <a:fld id="{370547DC-8235-9043-BAD3-3D5B5F6916E7}" type="datetimeFigureOut">
               <a:rPr lang="en-US" smtClean="0"/>
-              <a:t>2/2/24</a:t>
+              <a:t>2/8/24</a:t>
             </a:fld>
             <a:endParaRPr lang="en-US"/>
           </a:p>
@@ -1142,7 +1147,7 @@
           <a:p>
             <a:fld id="{370547DC-8235-9043-BAD3-3D5B5F6916E7}" type="datetimeFigureOut">
               <a:rPr lang="en-US" smtClean="0"/>
-              <a:t>2/2/24</a:t>
+              <a:t>2/8/24</a:t>
             </a:fld>
             <a:endParaRPr lang="en-US"/>
           </a:p>
@@ -1410,7 +1415,7 @@
           <a:p>
             <a:fld id="{370547DC-8235-9043-BAD3-3D5B5F6916E7}" type="datetimeFigureOut">
               <a:rPr lang="en-US" smtClean="0"/>
-              <a:t>2/2/24</a:t>
+              <a:t>2/8/24</a:t>
             </a:fld>
             <a:endParaRPr lang="en-US"/>
           </a:p>
@@ -1825,7 +1830,7 @@
           <a:p>
             <a:fld id="{370547DC-8235-9043-BAD3-3D5B5F6916E7}" type="datetimeFigureOut">
               <a:rPr lang="en-US" smtClean="0"/>
-              <a:t>2/2/24</a:t>
+              <a:t>2/8/24</a:t>
             </a:fld>
             <a:endParaRPr lang="en-US"/>
           </a:p>
@@ -1967,7 +1972,7 @@
           <a:p>
             <a:fld id="{370547DC-8235-9043-BAD3-3D5B5F6916E7}" type="datetimeFigureOut">
               <a:rPr lang="en-US" smtClean="0"/>
-              <a:t>2/2/24</a:t>
+              <a:t>2/8/24</a:t>
             </a:fld>
             <a:endParaRPr lang="en-US"/>
           </a:p>
@@ -2080,7 +2085,7 @@
           <a:p>
             <a:fld id="{370547DC-8235-9043-BAD3-3D5B5F6916E7}" type="datetimeFigureOut">
               <a:rPr lang="en-US" smtClean="0"/>
-              <a:t>2/2/24</a:t>
+              <a:t>2/8/24</a:t>
             </a:fld>
             <a:endParaRPr lang="en-US"/>
           </a:p>
@@ -2393,7 +2398,7 @@
           <a:p>
             <a:fld id="{370547DC-8235-9043-BAD3-3D5B5F6916E7}" type="datetimeFigureOut">
               <a:rPr lang="en-US" smtClean="0"/>
-              <a:t>2/2/24</a:t>
+              <a:t>2/8/24</a:t>
             </a:fld>
             <a:endParaRPr lang="en-US"/>
           </a:p>
@@ -2682,7 +2687,7 @@
           <a:p>
             <a:fld id="{370547DC-8235-9043-BAD3-3D5B5F6916E7}" type="datetimeFigureOut">
               <a:rPr lang="en-US" smtClean="0"/>
-              <a:t>2/2/24</a:t>
+              <a:t>2/8/24</a:t>
             </a:fld>
             <a:endParaRPr lang="en-US"/>
           </a:p>
@@ -2925,7 +2930,7 @@
           <a:p>
             <a:fld id="{370547DC-8235-9043-BAD3-3D5B5F6916E7}" type="datetimeFigureOut">
               <a:rPr lang="en-US" smtClean="0"/>
-              <a:t>2/2/24</a:t>
+              <a:t>2/8/24</a:t>
             </a:fld>
             <a:endParaRPr lang="en-US"/>
           </a:p>
@@ -4005,8 +4010,17 @@
           <a:p>
             <a:r>
               <a:rPr lang="en-US" sz="1200" b="1" dirty="0"/>
-              <a:t>Return: ACK</a:t>
-            </a:r>
+              <a:t>Return: </a:t>
+            </a:r>
+            <a:r>
+              <a:rPr lang="en-US" sz="1200" b="1" dirty="0" err="1"/>
+              <a:t>AggregationSource</a:t>
+            </a:r>
+            <a:r>
+              <a:rPr lang="en-US" sz="1200" b="1"/>
+              <a:t> object</a:t>
+            </a:r>
+            <a:endParaRPr lang="en-US" sz="1200" b="1" dirty="0"/>
           </a:p>
         </p:txBody>
       </p:sp>

</xml_diff>

<commit_message>
Edits from April 5th
</commit_message>
<xml_diff>
--- a/imgs/sources.pptx
+++ b/imgs/sources.pptx
@@ -4013,12 +4013,12 @@
               <a:t>PATCH: </a:t>
             </a:r>
             <a:r>
-              <a:rPr lang="en-US" sz="1200" b="1"/>
-              <a:t>EventDestination </a:t>
+              <a:rPr lang="en-US" sz="1200" b="1" dirty="0" err="1"/>
+              <a:t>EventDestination</a:t>
             </a:r>
             <a:r>
               <a:rPr lang="en-US" sz="1200" b="1" dirty="0"/>
-              <a:t>object</a:t>
+              <a:t> object</a:t>
             </a:r>
           </a:p>
         </p:txBody>

</xml_diff>